<commit_message>
- Numaralandirma hatasi duzeltildi.
</commit_message>
<xml_diff>
--- a/RingOscillator/Presentation/RingOscillatorSimulation.pptx
+++ b/RingOscillator/Presentation/RingOscillatorSimulation.pptx
@@ -6076,16 +6076,12 @@
           </a:lstStyle>
           <a:p>
             <a:r>
-              <a:rPr lang="en-US" b="1" dirty="0"/>
-              <a:t>VI</a:t>
-            </a:r>
-            <a:r>
-              <a:rPr lang="tr-TR" b="1" dirty="0"/>
-              <a:t>.</a:t>
+              <a:rPr lang="en-US" b="1"/>
+              <a:t>VII</a:t>
             </a:r>
             <a:r>
               <a:rPr lang="tr-TR" b="1"/>
-              <a:t>	</a:t>
+              <a:t>.	</a:t>
             </a:r>
             <a:r>
               <a:rPr lang="en-US" b="1"/>
@@ -6355,16 +6351,12 @@
           </a:lstStyle>
           <a:p>
             <a:r>
-              <a:rPr lang="en-US" b="1" dirty="0"/>
-              <a:t>VI</a:t>
-            </a:r>
-            <a:r>
-              <a:rPr lang="tr-TR" b="1" dirty="0"/>
-              <a:t>.</a:t>
+              <a:rPr lang="en-US" b="1"/>
+              <a:t>VII</a:t>
             </a:r>
             <a:r>
               <a:rPr lang="tr-TR" b="1"/>
-              <a:t>	</a:t>
+              <a:t>.	</a:t>
             </a:r>
             <a:r>
               <a:rPr lang="en-US" b="1"/>
@@ -6800,12 +6792,16 @@
           </a:lstStyle>
           <a:p>
             <a:r>
-              <a:rPr lang="en-US" b="1" dirty="0"/>
-              <a:t>VII</a:t>
+              <a:rPr lang="en-US" b="1"/>
+              <a:t>VIII</a:t>
+            </a:r>
+            <a:r>
+              <a:rPr lang="tr-TR" b="1"/>
+              <a:t>.</a:t>
             </a:r>
             <a:r>
               <a:rPr lang="tr-TR" b="1" dirty="0"/>
-              <a:t>.	</a:t>
+              <a:t>	</a:t>
             </a:r>
             <a:r>
               <a:rPr lang="en-US" b="1" dirty="0"/>

</xml_diff>